<commit_message>
make scale bar text larger
</commit_message>
<xml_diff>
--- a/Output/Pub_figs/ppt_shame_folder/Fig1_panel.pptx
+++ b/Output/Pub_figs/ppt_shame_folder/Fig1_panel.pptx
@@ -197,7 +197,7 @@
           <a:p>
             <a:fld id="{8C547A30-B33E-0F4D-80D3-447684F1AE93}" type="datetimeFigureOut">
               <a:rPr lang="en-US" smtClean="0"/>
-              <a:t>9/18/24</a:t>
+              <a:t>11/12/24</a:t>
             </a:fld>
             <a:endParaRPr lang="en-US"/>
           </a:p>
@@ -679,7 +679,7 @@
           <a:p>
             <a:fld id="{920285A9-D9B7-E64A-891F-D75C53CC6425}" type="datetimeFigureOut">
               <a:rPr lang="en-US" smtClean="0"/>
-              <a:t>9/18/24</a:t>
+              <a:t>11/12/24</a:t>
             </a:fld>
             <a:endParaRPr lang="en-US"/>
           </a:p>
@@ -849,7 +849,7 @@
           <a:p>
             <a:fld id="{920285A9-D9B7-E64A-891F-D75C53CC6425}" type="datetimeFigureOut">
               <a:rPr lang="en-US" smtClean="0"/>
-              <a:t>9/18/24</a:t>
+              <a:t>11/12/24</a:t>
             </a:fld>
             <a:endParaRPr lang="en-US"/>
           </a:p>
@@ -1029,7 +1029,7 @@
           <a:p>
             <a:fld id="{920285A9-D9B7-E64A-891F-D75C53CC6425}" type="datetimeFigureOut">
               <a:rPr lang="en-US" smtClean="0"/>
-              <a:t>9/18/24</a:t>
+              <a:t>11/12/24</a:t>
             </a:fld>
             <a:endParaRPr lang="en-US"/>
           </a:p>
@@ -1199,7 +1199,7 @@
           <a:p>
             <a:fld id="{920285A9-D9B7-E64A-891F-D75C53CC6425}" type="datetimeFigureOut">
               <a:rPr lang="en-US" smtClean="0"/>
-              <a:t>9/18/24</a:t>
+              <a:t>11/12/24</a:t>
             </a:fld>
             <a:endParaRPr lang="en-US"/>
           </a:p>
@@ -1445,7 +1445,7 @@
           <a:p>
             <a:fld id="{920285A9-D9B7-E64A-891F-D75C53CC6425}" type="datetimeFigureOut">
               <a:rPr lang="en-US" smtClean="0"/>
-              <a:t>9/18/24</a:t>
+              <a:t>11/12/24</a:t>
             </a:fld>
             <a:endParaRPr lang="en-US"/>
           </a:p>
@@ -1677,7 +1677,7 @@
           <a:p>
             <a:fld id="{920285A9-D9B7-E64A-891F-D75C53CC6425}" type="datetimeFigureOut">
               <a:rPr lang="en-US" smtClean="0"/>
-              <a:t>9/18/24</a:t>
+              <a:t>11/12/24</a:t>
             </a:fld>
             <a:endParaRPr lang="en-US"/>
           </a:p>
@@ -2044,7 +2044,7 @@
           <a:p>
             <a:fld id="{920285A9-D9B7-E64A-891F-D75C53CC6425}" type="datetimeFigureOut">
               <a:rPr lang="en-US" smtClean="0"/>
-              <a:t>9/18/24</a:t>
+              <a:t>11/12/24</a:t>
             </a:fld>
             <a:endParaRPr lang="en-US"/>
           </a:p>
@@ -2162,7 +2162,7 @@
           <a:p>
             <a:fld id="{920285A9-D9B7-E64A-891F-D75C53CC6425}" type="datetimeFigureOut">
               <a:rPr lang="en-US" smtClean="0"/>
-              <a:t>9/18/24</a:t>
+              <a:t>11/12/24</a:t>
             </a:fld>
             <a:endParaRPr lang="en-US"/>
           </a:p>
@@ -2257,7 +2257,7 @@
           <a:p>
             <a:fld id="{920285A9-D9B7-E64A-891F-D75C53CC6425}" type="datetimeFigureOut">
               <a:rPr lang="en-US" smtClean="0"/>
-              <a:t>9/18/24</a:t>
+              <a:t>11/12/24</a:t>
             </a:fld>
             <a:endParaRPr lang="en-US"/>
           </a:p>
@@ -2534,7 +2534,7 @@
           <a:p>
             <a:fld id="{920285A9-D9B7-E64A-891F-D75C53CC6425}" type="datetimeFigureOut">
               <a:rPr lang="en-US" smtClean="0"/>
-              <a:t>9/18/24</a:t>
+              <a:t>11/12/24</a:t>
             </a:fld>
             <a:endParaRPr lang="en-US"/>
           </a:p>
@@ -2791,7 +2791,7 @@
           <a:p>
             <a:fld id="{920285A9-D9B7-E64A-891F-D75C53CC6425}" type="datetimeFigureOut">
               <a:rPr lang="en-US" smtClean="0"/>
-              <a:t>9/18/24</a:t>
+              <a:t>11/12/24</a:t>
             </a:fld>
             <a:endParaRPr lang="en-US"/>
           </a:p>
@@ -3004,7 +3004,7 @@
           <a:p>
             <a:fld id="{920285A9-D9B7-E64A-891F-D75C53CC6425}" type="datetimeFigureOut">
               <a:rPr lang="en-US" smtClean="0"/>
-              <a:t>9/18/24</a:t>
+              <a:t>11/12/24</a:t>
             </a:fld>
             <a:endParaRPr lang="en-US"/>
           </a:p>
@@ -3409,6 +3409,36 @@
           <a:chExt cx="0" cy="0"/>
         </a:xfrm>
       </p:grpSpPr>
+      <p:pic>
+        <p:nvPicPr>
+          <p:cNvPr id="4" name="Picture 3" descr="A map of the world with different colored circles&#10;&#10;Description automatically generated">
+            <a:extLst>
+              <a:ext uri="{FF2B5EF4-FFF2-40B4-BE49-F238E27FC236}">
+                <a16:creationId xmlns:a16="http://schemas.microsoft.com/office/drawing/2014/main" id="{4B190C16-BDDC-A0F4-E039-92AAE79C0A2A}"/>
+              </a:ext>
+            </a:extLst>
+          </p:cNvPr>
+          <p:cNvPicPr>
+            <a:picLocks noChangeAspect="1"/>
+          </p:cNvPicPr>
+          <p:nvPr/>
+        </p:nvPicPr>
+        <p:blipFill>
+          <a:blip r:embed="rId3"/>
+          <a:stretch>
+            <a:fillRect/>
+          </a:stretch>
+        </p:blipFill>
+        <p:spPr>
+          <a:xfrm>
+            <a:off x="-24" y="1672335"/>
+            <a:ext cx="4572000" cy="3266434"/>
+          </a:xfrm>
+          <a:prstGeom prst="rect">
+            <a:avLst/>
+          </a:prstGeom>
+        </p:spPr>
+      </p:pic>
       <p:grpSp>
         <p:nvGrpSpPr>
           <p:cNvPr id="5" name="Group 4">
@@ -3444,7 +3474,7 @@
             <p:nvPr/>
           </p:nvPicPr>
           <p:blipFill rotWithShape="1">
-            <a:blip r:embed="rId3"/>
+            <a:blip r:embed="rId4"/>
             <a:srcRect l="44456" t="36578" r="37377" b="31254"/>
             <a:stretch/>
           </p:blipFill>
@@ -4480,10 +4510,10 @@
             <p:nvPr/>
           </p:nvPicPr>
           <p:blipFill rotWithShape="1">
-            <a:blip r:embed="rId4">
+            <a:blip r:embed="rId5">
               <a:extLst>
                 <a:ext uri="{96DAC541-7B7A-43D3-8B79-37D633B846F1}">
-                  <asvg:svgBlip xmlns:asvg="http://schemas.microsoft.com/office/drawing/2016/SVG/main" r:embed="rId5"/>
+                  <asvg:svgBlip xmlns:asvg="http://schemas.microsoft.com/office/drawing/2016/SVG/main" r:embed="rId6"/>
                 </a:ext>
               </a:extLst>
             </a:blip>
@@ -4725,10 +4755,10 @@
             <p:nvPr/>
           </p:nvPicPr>
           <p:blipFill rotWithShape="1">
-            <a:blip r:embed="rId4">
+            <a:blip r:embed="rId5">
               <a:extLst>
                 <a:ext uri="{96DAC541-7B7A-43D3-8B79-37D633B846F1}">
-                  <asvg:svgBlip xmlns:asvg="http://schemas.microsoft.com/office/drawing/2016/SVG/main" r:embed="rId5"/>
+                  <asvg:svgBlip xmlns:asvg="http://schemas.microsoft.com/office/drawing/2016/SVG/main" r:embed="rId6"/>
                 </a:ext>
               </a:extLst>
             </a:blip>
@@ -4760,10 +4790,10 @@
             <p:nvPr/>
           </p:nvPicPr>
           <p:blipFill rotWithShape="1">
-            <a:blip r:embed="rId4">
+            <a:blip r:embed="rId5">
               <a:extLst>
                 <a:ext uri="{96DAC541-7B7A-43D3-8B79-37D633B846F1}">
-                  <asvg:svgBlip xmlns:asvg="http://schemas.microsoft.com/office/drawing/2016/SVG/main" r:embed="rId5"/>
+                  <asvg:svgBlip xmlns:asvg="http://schemas.microsoft.com/office/drawing/2016/SVG/main" r:embed="rId6"/>
                 </a:ext>
               </a:extLst>
             </a:blip>
@@ -4795,10 +4825,10 @@
             <p:nvPr/>
           </p:nvPicPr>
           <p:blipFill rotWithShape="1">
-            <a:blip r:embed="rId4">
+            <a:blip r:embed="rId5">
               <a:extLst>
                 <a:ext uri="{96DAC541-7B7A-43D3-8B79-37D633B846F1}">
-                  <asvg:svgBlip xmlns:asvg="http://schemas.microsoft.com/office/drawing/2016/SVG/main" r:embed="rId5"/>
+                  <asvg:svgBlip xmlns:asvg="http://schemas.microsoft.com/office/drawing/2016/SVG/main" r:embed="rId6"/>
                 </a:ext>
               </a:extLst>
             </a:blip>
@@ -4830,10 +4860,10 @@
             <p:nvPr/>
           </p:nvPicPr>
           <p:blipFill>
-            <a:blip r:embed="rId6">
+            <a:blip r:embed="rId7">
               <a:extLst>
                 <a:ext uri="{96DAC541-7B7A-43D3-8B79-37D633B846F1}">
-                  <asvg:svgBlip xmlns:asvg="http://schemas.microsoft.com/office/drawing/2016/SVG/main" r:embed="rId7"/>
+                  <asvg:svgBlip xmlns:asvg="http://schemas.microsoft.com/office/drawing/2016/SVG/main" r:embed="rId8"/>
                 </a:ext>
               </a:extLst>
             </a:blip>
@@ -4866,10 +4896,10 @@
             <p:nvPr/>
           </p:nvPicPr>
           <p:blipFill>
-            <a:blip r:embed="rId8">
+            <a:blip r:embed="rId9">
               <a:extLst>
                 <a:ext uri="{96DAC541-7B7A-43D3-8B79-37D633B846F1}">
-                  <asvg:svgBlip xmlns:asvg="http://schemas.microsoft.com/office/drawing/2016/SVG/main" r:embed="rId9"/>
+                  <asvg:svgBlip xmlns:asvg="http://schemas.microsoft.com/office/drawing/2016/SVG/main" r:embed="rId10"/>
                 </a:ext>
               </a:extLst>
             </a:blip>
@@ -4902,10 +4932,10 @@
             <p:nvPr/>
           </p:nvPicPr>
           <p:blipFill>
-            <a:blip r:embed="rId6">
+            <a:blip r:embed="rId7">
               <a:extLst>
                 <a:ext uri="{96DAC541-7B7A-43D3-8B79-37D633B846F1}">
-                  <asvg:svgBlip xmlns:asvg="http://schemas.microsoft.com/office/drawing/2016/SVG/main" r:embed="rId7"/>
+                  <asvg:svgBlip xmlns:asvg="http://schemas.microsoft.com/office/drawing/2016/SVG/main" r:embed="rId8"/>
                 </a:ext>
               </a:extLst>
             </a:blip>
@@ -4938,10 +4968,10 @@
             <p:nvPr/>
           </p:nvPicPr>
           <p:blipFill>
-            <a:blip r:embed="rId10">
+            <a:blip r:embed="rId11">
               <a:extLst>
                 <a:ext uri="{96DAC541-7B7A-43D3-8B79-37D633B846F1}">
-                  <asvg:svgBlip xmlns:asvg="http://schemas.microsoft.com/office/drawing/2016/SVG/main" r:embed="rId11"/>
+                  <asvg:svgBlip xmlns:asvg="http://schemas.microsoft.com/office/drawing/2016/SVG/main" r:embed="rId12"/>
                 </a:ext>
               </a:extLst>
             </a:blip>
@@ -5135,10 +5165,10 @@
             <p:nvPr/>
           </p:nvPicPr>
           <p:blipFill rotWithShape="1">
-            <a:blip r:embed="rId4">
+            <a:blip r:embed="rId5">
               <a:extLst>
                 <a:ext uri="{96DAC541-7B7A-43D3-8B79-37D633B846F1}">
-                  <asvg:svgBlip xmlns:asvg="http://schemas.microsoft.com/office/drawing/2016/SVG/main" r:embed="rId5"/>
+                  <asvg:svgBlip xmlns:asvg="http://schemas.microsoft.com/office/drawing/2016/SVG/main" r:embed="rId6"/>
                 </a:ext>
               </a:extLst>
             </a:blip>
@@ -5170,10 +5200,10 @@
             <p:nvPr/>
           </p:nvPicPr>
           <p:blipFill rotWithShape="1">
-            <a:blip r:embed="rId4">
+            <a:blip r:embed="rId5">
               <a:extLst>
                 <a:ext uri="{96DAC541-7B7A-43D3-8B79-37D633B846F1}">
-                  <asvg:svgBlip xmlns:asvg="http://schemas.microsoft.com/office/drawing/2016/SVG/main" r:embed="rId5"/>
+                  <asvg:svgBlip xmlns:asvg="http://schemas.microsoft.com/office/drawing/2016/SVG/main" r:embed="rId6"/>
                 </a:ext>
               </a:extLst>
             </a:blip>
@@ -5275,10 +5305,10 @@
             <p:nvPr/>
           </p:nvPicPr>
           <p:blipFill rotWithShape="1">
-            <a:blip r:embed="rId4">
+            <a:blip r:embed="rId5">
               <a:extLst>
                 <a:ext uri="{96DAC541-7B7A-43D3-8B79-37D633B846F1}">
-                  <asvg:svgBlip xmlns:asvg="http://schemas.microsoft.com/office/drawing/2016/SVG/main" r:embed="rId5"/>
+                  <asvg:svgBlip xmlns:asvg="http://schemas.microsoft.com/office/drawing/2016/SVG/main" r:embed="rId6"/>
                 </a:ext>
               </a:extLst>
             </a:blip>
@@ -5310,10 +5340,10 @@
             <p:nvPr/>
           </p:nvPicPr>
           <p:blipFill rotWithShape="1">
-            <a:blip r:embed="rId4">
+            <a:blip r:embed="rId5">
               <a:extLst>
                 <a:ext uri="{96DAC541-7B7A-43D3-8B79-37D633B846F1}">
-                  <asvg:svgBlip xmlns:asvg="http://schemas.microsoft.com/office/drawing/2016/SVG/main" r:embed="rId5"/>
+                  <asvg:svgBlip xmlns:asvg="http://schemas.microsoft.com/office/drawing/2016/SVG/main" r:embed="rId6"/>
                 </a:ext>
               </a:extLst>
             </a:blip>
@@ -5625,7 +5655,7 @@
             <p:nvPr/>
           </p:nvPicPr>
           <p:blipFill>
-            <a:blip r:embed="rId12"/>
+            <a:blip r:embed="rId13"/>
             <a:stretch>
               <a:fillRect/>
             </a:stretch>
@@ -5655,7 +5685,7 @@
             <p:nvPr/>
           </p:nvPicPr>
           <p:blipFill rotWithShape="1">
-            <a:blip r:embed="rId13"/>
+            <a:blip r:embed="rId14"/>
             <a:srcRect l="24381" t="4893" r="18630" b="23779"/>
             <a:stretch/>
           </p:blipFill>
@@ -5760,7 +5790,7 @@
             <p:nvPr/>
           </p:nvPicPr>
           <p:blipFill>
-            <a:blip r:embed="rId12"/>
+            <a:blip r:embed="rId13"/>
             <a:stretch>
               <a:fillRect/>
             </a:stretch>
@@ -5790,7 +5820,7 @@
             <p:nvPr/>
           </p:nvPicPr>
           <p:blipFill>
-            <a:blip r:embed="rId12"/>
+            <a:blip r:embed="rId13"/>
             <a:stretch>
               <a:fillRect/>
             </a:stretch>
@@ -6016,36 +6046,6 @@
           </a:p>
         </p:txBody>
       </p:sp>
-      <p:pic>
-        <p:nvPicPr>
-          <p:cNvPr id="65" name="Picture 64" descr="A map of the world with different colored circles&#10;&#10;Description automatically generated">
-            <a:extLst>
-              <a:ext uri="{FF2B5EF4-FFF2-40B4-BE49-F238E27FC236}">
-                <a16:creationId xmlns:a16="http://schemas.microsoft.com/office/drawing/2014/main" id="{AA8BD4CA-FE56-2D18-6EB0-FADA5E21F0EF}"/>
-              </a:ext>
-            </a:extLst>
-          </p:cNvPr>
-          <p:cNvPicPr>
-            <a:picLocks noChangeAspect="1"/>
-          </p:cNvPicPr>
-          <p:nvPr/>
-        </p:nvPicPr>
-        <p:blipFill>
-          <a:blip r:embed="rId14"/>
-          <a:stretch>
-            <a:fillRect/>
-          </a:stretch>
-        </p:blipFill>
-        <p:spPr>
-          <a:xfrm>
-            <a:off x="-1330" y="1672335"/>
-            <a:ext cx="4572000" cy="3266434"/>
-          </a:xfrm>
-          <a:prstGeom prst="rect">
-            <a:avLst/>
-          </a:prstGeom>
-        </p:spPr>
-      </p:pic>
       <p:sp>
         <p:nvSpPr>
           <p:cNvPr id="66" name="TextBox 65">

</xml_diff>